<commit_message>
updated flowchart ppt (2)
</commit_message>
<xml_diff>
--- a/ui_flowchart.pptx
+++ b/ui_flowchart.pptx
@@ -3598,7 +3598,7 @@
         </p:nvSpPr>
         <p:spPr>
           <a:xfrm>
-            <a:off x="5677967" y="2080537"/>
+            <a:off x="5679115" y="2039317"/>
             <a:ext cx="3628799" cy="523220"/>
           </a:xfrm>
           <a:prstGeom prst="rect">
@@ -3633,7 +3633,7 @@
         </p:nvSpPr>
         <p:spPr>
           <a:xfrm>
-            <a:off x="1525037" y="5517100"/>
+            <a:off x="2957377" y="5519405"/>
             <a:ext cx="1243913" cy="1025395"/>
           </a:xfrm>
           <a:prstGeom prst="rect">
@@ -3692,7 +3692,7 @@
         </p:nvSpPr>
         <p:spPr>
           <a:xfrm>
-            <a:off x="775533" y="4997224"/>
+            <a:off x="2266157" y="5033478"/>
             <a:ext cx="1810624" cy="307777"/>
           </a:xfrm>
           <a:prstGeom prst="rect">
@@ -4033,7 +4033,7 @@
         </p:nvCxnSpPr>
         <p:spPr>
           <a:xfrm>
-            <a:off x="2785432" y="5041557"/>
+            <a:off x="4186129" y="5012804"/>
             <a:ext cx="0" cy="292197"/>
           </a:xfrm>
           <a:prstGeom prst="straightConnector1">
@@ -4075,7 +4075,7 @@
         </p:nvSpPr>
         <p:spPr>
           <a:xfrm>
-            <a:off x="2781314" y="5517100"/>
+            <a:off x="4213654" y="5519405"/>
             <a:ext cx="1243913" cy="1025395"/>
           </a:xfrm>
           <a:prstGeom prst="rect">
@@ -4134,7 +4134,7 @@
         </p:nvSpPr>
         <p:spPr>
           <a:xfrm rot="16200000" flipV="1">
-            <a:off x="3561575" y="4470498"/>
+            <a:off x="4925578" y="4614091"/>
             <a:ext cx="1249109" cy="1810625"/>
           </a:xfrm>
           <a:prstGeom prst="arc">
@@ -4188,7 +4188,7 @@
         </p:nvSpPr>
         <p:spPr>
           <a:xfrm>
-            <a:off x="1816442" y="4255043"/>
+            <a:off x="3289968" y="4290161"/>
             <a:ext cx="1929745" cy="641833"/>
           </a:xfrm>
           <a:prstGeom prst="rect">
@@ -4250,7 +4250,145 @@
         <p:spPr>
           <a:xfrm>
             <a:off x="2781314" y="3840174"/>
-            <a:ext cx="0" cy="292197"/>
+            <a:ext cx="1243913" cy="311712"/>
+          </a:xfrm>
+          <a:prstGeom prst="straightConnector1">
+            <a:avLst/>
+          </a:prstGeom>
+          <a:ln w="38100">
+            <a:solidFill>
+              <a:schemeClr val="tx1"/>
+            </a:solidFill>
+            <a:tailEnd type="triangle"/>
+          </a:ln>
+        </p:spPr>
+        <p:style>
+          <a:lnRef idx="1">
+            <a:schemeClr val="accent1"/>
+          </a:lnRef>
+          <a:fillRef idx="0">
+            <a:schemeClr val="accent1"/>
+          </a:fillRef>
+          <a:effectRef idx="0">
+            <a:schemeClr val="accent1"/>
+          </a:effectRef>
+          <a:fontRef idx="minor">
+            <a:schemeClr val="tx1"/>
+          </a:fontRef>
+        </p:style>
+      </p:cxnSp>
+      <p:sp>
+        <p:nvSpPr>
+          <p:cNvPr id="3" name="TextBox 2">
+            <a:extLst>
+              <a:ext uri="{FF2B5EF4-FFF2-40B4-BE49-F238E27FC236}">
+                <a16:creationId xmlns:a16="http://schemas.microsoft.com/office/drawing/2014/main" id="{7A4E9BCD-B060-2D60-923B-8DE6FB2BA6CA}"/>
+              </a:ext>
+            </a:extLst>
+          </p:cNvPr>
+          <p:cNvSpPr txBox="1"/>
+          <p:nvPr/>
+        </p:nvSpPr>
+        <p:spPr>
+          <a:xfrm>
+            <a:off x="5319146" y="3821190"/>
+            <a:ext cx="3813546" cy="523220"/>
+          </a:xfrm>
+          <a:prstGeom prst="rect">
+            <a:avLst/>
+          </a:prstGeom>
+          <a:noFill/>
+        </p:spPr>
+        <p:txBody>
+          <a:bodyPr wrap="square" rtlCol="0">
+            <a:spAutoFit/>
+          </a:bodyPr>
+          <a:lstStyle/>
+          <a:p>
+            <a:r>
+              <a:rPr lang="en-DE" sz="1400" dirty="0"/>
+              <a:t>User does not say anything / voice recognition produces invalid results</a:t>
+            </a:r>
+          </a:p>
+        </p:txBody>
+      </p:sp>
+      <p:sp>
+        <p:nvSpPr>
+          <p:cNvPr id="13" name="Rectangle 12">
+            <a:extLst>
+              <a:ext uri="{FF2B5EF4-FFF2-40B4-BE49-F238E27FC236}">
+                <a16:creationId xmlns:a16="http://schemas.microsoft.com/office/drawing/2014/main" id="{FE47E440-5708-7988-6709-EADA7583B9EA}"/>
+              </a:ext>
+            </a:extLst>
+          </p:cNvPr>
+          <p:cNvSpPr/>
+          <p:nvPr/>
+        </p:nvSpPr>
+        <p:spPr>
+          <a:xfrm>
+            <a:off x="7547181" y="4290160"/>
+            <a:ext cx="1929745" cy="641833"/>
+          </a:xfrm>
+          <a:prstGeom prst="rect">
+            <a:avLst/>
+          </a:prstGeom>
+          <a:solidFill>
+            <a:schemeClr val="accent1">
+              <a:lumMod val="40000"/>
+              <a:lumOff val="60000"/>
+            </a:schemeClr>
+          </a:solidFill>
+        </p:spPr>
+        <p:style>
+          <a:lnRef idx="2">
+            <a:schemeClr val="accent1">
+              <a:shade val="15000"/>
+            </a:schemeClr>
+          </a:lnRef>
+          <a:fillRef idx="1">
+            <a:schemeClr val="accent1"/>
+          </a:fillRef>
+          <a:effectRef idx="0">
+            <a:schemeClr val="accent1"/>
+          </a:effectRef>
+          <a:fontRef idx="minor">
+            <a:schemeClr val="lt1"/>
+          </a:fontRef>
+        </p:style>
+        <p:txBody>
+          <a:bodyPr rtlCol="0" anchor="ctr"/>
+          <a:lstStyle/>
+          <a:p>
+            <a:pPr algn="ctr"/>
+            <a:r>
+              <a:rPr lang="en-DE" sz="1600" dirty="0">
+                <a:solidFill>
+                  <a:schemeClr val="tx1"/>
+                </a:solidFill>
+              </a:rPr>
+              <a:t>Say: “Sorry, I could not understand.”</a:t>
+            </a:r>
+          </a:p>
+        </p:txBody>
+      </p:sp>
+      <p:cxnSp>
+        <p:nvCxnSpPr>
+          <p:cNvPr id="23" name="Straight Arrow Connector 22">
+            <a:extLst>
+              <a:ext uri="{FF2B5EF4-FFF2-40B4-BE49-F238E27FC236}">
+                <a16:creationId xmlns:a16="http://schemas.microsoft.com/office/drawing/2014/main" id="{D6EDCDB6-FE2E-A844-5672-66E7ACBF12D5}"/>
+              </a:ext>
+            </a:extLst>
+          </p:cNvPr>
+          <p:cNvCxnSpPr>
+            <a:cxnSpLocks/>
+          </p:cNvCxnSpPr>
+          <p:nvPr/>
+        </p:nvCxnSpPr>
+        <p:spPr>
+          <a:xfrm>
+            <a:off x="5375529" y="4402201"/>
+            <a:ext cx="1902200" cy="0"/>
           </a:xfrm>
           <a:prstGeom prst="straightConnector1">
             <a:avLst/>
@@ -4279,10 +4417,10 @@
       </p:cxnSp>
       <p:cxnSp>
         <p:nvCxnSpPr>
-          <p:cNvPr id="2" name="Straight Arrow Connector 1">
-            <a:extLst>
-              <a:ext uri="{FF2B5EF4-FFF2-40B4-BE49-F238E27FC236}">
-                <a16:creationId xmlns:a16="http://schemas.microsoft.com/office/drawing/2014/main" id="{93EC2BDF-177C-E0C8-BC27-F3A28ADB63A3}"/>
+          <p:cNvPr id="25" name="Straight Arrow Connector 24">
+            <a:extLst>
+              <a:ext uri="{FF2B5EF4-FFF2-40B4-BE49-F238E27FC236}">
+                <a16:creationId xmlns:a16="http://schemas.microsoft.com/office/drawing/2014/main" id="{C105F9F4-14AA-0CFE-A34F-D6FEB8869394}"/>
               </a:ext>
             </a:extLst>
           </p:cNvPr>
@@ -4292,9 +4430,9 @@
           <p:nvPr/>
         </p:nvCxnSpPr>
         <p:spPr>
-          <a:xfrm flipV="1">
-            <a:off x="3833903" y="3932442"/>
-            <a:ext cx="1281794" cy="597569"/>
+          <a:xfrm flipH="1">
+            <a:off x="5375529" y="4753261"/>
+            <a:ext cx="1902200" cy="0"/>
           </a:xfrm>
           <a:prstGeom prst="straightConnector1">
             <a:avLst/>
@@ -4321,41 +4459,6 @@
           </a:fontRef>
         </p:style>
       </p:cxnSp>
-      <p:sp>
-        <p:nvSpPr>
-          <p:cNvPr id="3" name="TextBox 2">
-            <a:extLst>
-              <a:ext uri="{FF2B5EF4-FFF2-40B4-BE49-F238E27FC236}">
-                <a16:creationId xmlns:a16="http://schemas.microsoft.com/office/drawing/2014/main" id="{7A4E9BCD-B060-2D60-923B-8DE6FB2BA6CA}"/>
-              </a:ext>
-            </a:extLst>
-          </p:cNvPr>
-          <p:cNvSpPr txBox="1"/>
-          <p:nvPr/>
-        </p:nvSpPr>
-        <p:spPr>
-          <a:xfrm>
-            <a:off x="4632269" y="4095781"/>
-            <a:ext cx="3813546" cy="523220"/>
-          </a:xfrm>
-          <a:prstGeom prst="rect">
-            <a:avLst/>
-          </a:prstGeom>
-          <a:noFill/>
-        </p:spPr>
-        <p:txBody>
-          <a:bodyPr wrap="square" rtlCol="0">
-            <a:spAutoFit/>
-          </a:bodyPr>
-          <a:lstStyle/>
-          <a:p>
-            <a:r>
-              <a:rPr lang="en-DE" sz="1400" dirty="0"/>
-              <a:t>User does not say anything / voice recognition produces invalid results</a:t>
-            </a:r>
-          </a:p>
-        </p:txBody>
-      </p:sp>
     </p:spTree>
     <p:extLst>
       <p:ext uri="{BB962C8B-B14F-4D97-AF65-F5344CB8AC3E}">

</xml_diff>